<commit_message>
Test "buy me a coffee"
</commit_message>
<xml_diff>
--- a/docs/images/listing_images.pptx
+++ b/docs/images/listing_images.pptx
@@ -8,6 +8,7 @@
     <p:sldId id="258" r:id="rId2"/>
     <p:sldId id="260" r:id="rId3"/>
     <p:sldId id="259" r:id="rId4"/>
+    <p:sldId id="261" r:id="rId5"/>
   </p:sldIdLst>
   <p:sldSz cx="12192000" cy="6858000"/>
   <p:notesSz cx="6858000" cy="9144000"/>
@@ -263,7 +264,7 @@
           <a:p>
             <a:fld id="{D66A3454-FE8B-43FF-A5CF-11748C0C9FCF}" type="datetimeFigureOut">
               <a:rPr lang="en-AU" smtClean="0"/>
-              <a:t>16/04/2025</a:t>
+              <a:t>18/04/2025</a:t>
             </a:fld>
             <a:endParaRPr lang="en-AU"/>
           </a:p>
@@ -463,7 +464,7 @@
           <a:p>
             <a:fld id="{D66A3454-FE8B-43FF-A5CF-11748C0C9FCF}" type="datetimeFigureOut">
               <a:rPr lang="en-AU" smtClean="0"/>
-              <a:t>16/04/2025</a:t>
+              <a:t>18/04/2025</a:t>
             </a:fld>
             <a:endParaRPr lang="en-AU"/>
           </a:p>
@@ -673,7 +674,7 @@
           <a:p>
             <a:fld id="{D66A3454-FE8B-43FF-A5CF-11748C0C9FCF}" type="datetimeFigureOut">
               <a:rPr lang="en-AU" smtClean="0"/>
-              <a:t>16/04/2025</a:t>
+              <a:t>18/04/2025</a:t>
             </a:fld>
             <a:endParaRPr lang="en-AU"/>
           </a:p>
@@ -873,7 +874,7 @@
           <a:p>
             <a:fld id="{D66A3454-FE8B-43FF-A5CF-11748C0C9FCF}" type="datetimeFigureOut">
               <a:rPr lang="en-AU" smtClean="0"/>
-              <a:t>16/04/2025</a:t>
+              <a:t>18/04/2025</a:t>
             </a:fld>
             <a:endParaRPr lang="en-AU"/>
           </a:p>
@@ -1149,7 +1150,7 @@
           <a:p>
             <a:fld id="{D66A3454-FE8B-43FF-A5CF-11748C0C9FCF}" type="datetimeFigureOut">
               <a:rPr lang="en-AU" smtClean="0"/>
-              <a:t>16/04/2025</a:t>
+              <a:t>18/04/2025</a:t>
             </a:fld>
             <a:endParaRPr lang="en-AU"/>
           </a:p>
@@ -1417,7 +1418,7 @@
           <a:p>
             <a:fld id="{D66A3454-FE8B-43FF-A5CF-11748C0C9FCF}" type="datetimeFigureOut">
               <a:rPr lang="en-AU" smtClean="0"/>
-              <a:t>16/04/2025</a:t>
+              <a:t>18/04/2025</a:t>
             </a:fld>
             <a:endParaRPr lang="en-AU"/>
           </a:p>
@@ -1832,7 +1833,7 @@
           <a:p>
             <a:fld id="{D66A3454-FE8B-43FF-A5CF-11748C0C9FCF}" type="datetimeFigureOut">
               <a:rPr lang="en-AU" smtClean="0"/>
-              <a:t>16/04/2025</a:t>
+              <a:t>18/04/2025</a:t>
             </a:fld>
             <a:endParaRPr lang="en-AU"/>
           </a:p>
@@ -1974,7 +1975,7 @@
           <a:p>
             <a:fld id="{D66A3454-FE8B-43FF-A5CF-11748C0C9FCF}" type="datetimeFigureOut">
               <a:rPr lang="en-AU" smtClean="0"/>
-              <a:t>16/04/2025</a:t>
+              <a:t>18/04/2025</a:t>
             </a:fld>
             <a:endParaRPr lang="en-AU"/>
           </a:p>
@@ -2087,7 +2088,7 @@
           <a:p>
             <a:fld id="{D66A3454-FE8B-43FF-A5CF-11748C0C9FCF}" type="datetimeFigureOut">
               <a:rPr lang="en-AU" smtClean="0"/>
-              <a:t>16/04/2025</a:t>
+              <a:t>18/04/2025</a:t>
             </a:fld>
             <a:endParaRPr lang="en-AU"/>
           </a:p>
@@ -2400,7 +2401,7 @@
           <a:p>
             <a:fld id="{D66A3454-FE8B-43FF-A5CF-11748C0C9FCF}" type="datetimeFigureOut">
               <a:rPr lang="en-AU" smtClean="0"/>
-              <a:t>16/04/2025</a:t>
+              <a:t>18/04/2025</a:t>
             </a:fld>
             <a:endParaRPr lang="en-AU"/>
           </a:p>
@@ -2689,7 +2690,7 @@
           <a:p>
             <a:fld id="{D66A3454-FE8B-43FF-A5CF-11748C0C9FCF}" type="datetimeFigureOut">
               <a:rPr lang="en-AU" smtClean="0"/>
-              <a:t>16/04/2025</a:t>
+              <a:t>18/04/2025</a:t>
             </a:fld>
             <a:endParaRPr lang="en-AU"/>
           </a:p>
@@ -2932,7 +2933,7 @@
           <a:p>
             <a:fld id="{D66A3454-FE8B-43FF-A5CF-11748C0C9FCF}" type="datetimeFigureOut">
               <a:rPr lang="en-AU" smtClean="0"/>
-              <a:t>16/04/2025</a:t>
+              <a:t>18/04/2025</a:t>
             </a:fld>
             <a:endParaRPr lang="en-AU"/>
           </a:p>
@@ -3793,6 +3794,573 @@
 </p:sld>
 </file>
 
+<file path=ppt/slides/slide4.xml><?xml version="1.0" encoding="utf-8"?>
+<p:sld xmlns:a="http://schemas.openxmlformats.org/drawingml/2006/main" xmlns:r="http://schemas.openxmlformats.org/officeDocument/2006/relationships" xmlns:p="http://schemas.openxmlformats.org/presentationml/2006/main">
+  <p:cSld>
+    <p:spTree>
+      <p:nvGrpSpPr>
+        <p:cNvPr id="1" name="">
+          <a:extLst>
+            <a:ext uri="{FF2B5EF4-FFF2-40B4-BE49-F238E27FC236}">
+              <a16:creationId xmlns:a16="http://schemas.microsoft.com/office/drawing/2014/main" id="{F6DC8F74-0C92-7108-7817-F30AFACA32F8}"/>
+            </a:ext>
+          </a:extLst>
+        </p:cNvPr>
+        <p:cNvGrpSpPr/>
+        <p:nvPr/>
+      </p:nvGrpSpPr>
+      <p:grpSpPr>
+        <a:xfrm>
+          <a:off x="0" y="0"/>
+          <a:ext cx="0" cy="0"/>
+          <a:chOff x="0" y="0"/>
+          <a:chExt cx="0" cy="0"/>
+        </a:xfrm>
+      </p:grpSpPr>
+      <p:sp>
+        <p:nvSpPr>
+          <p:cNvPr id="16" name="Rectangle 15">
+            <a:extLst>
+              <a:ext uri="{FF2B5EF4-FFF2-40B4-BE49-F238E27FC236}">
+                <a16:creationId xmlns:a16="http://schemas.microsoft.com/office/drawing/2014/main" id="{D9470EF1-4BC6-74F2-C11A-1B93A8285104}"/>
+              </a:ext>
+            </a:extLst>
+          </p:cNvPr>
+          <p:cNvSpPr/>
+          <p:nvPr/>
+        </p:nvSpPr>
+        <p:spPr>
+          <a:xfrm>
+            <a:off x="3326450" y="4396721"/>
+            <a:ext cx="5475600" cy="1800000"/>
+          </a:xfrm>
+          <a:prstGeom prst="rect">
+            <a:avLst/>
+          </a:prstGeom>
+          <a:solidFill>
+            <a:srgbClr val="00252A"/>
+          </a:solidFill>
+        </p:spPr>
+        <p:style>
+          <a:lnRef idx="2">
+            <a:schemeClr val="accent1">
+              <a:shade val="15000"/>
+            </a:schemeClr>
+          </a:lnRef>
+          <a:fillRef idx="1">
+            <a:schemeClr val="accent1"/>
+          </a:fillRef>
+          <a:effectRef idx="0">
+            <a:schemeClr val="accent1"/>
+          </a:effectRef>
+          <a:fontRef idx="minor">
+            <a:schemeClr val="lt1"/>
+          </a:fontRef>
+        </p:style>
+        <p:txBody>
+          <a:bodyPr rtlCol="0" anchor="ctr"/>
+          <a:lstStyle/>
+          <a:p>
+            <a:pPr algn="ctr"/>
+            <a:r>
+              <a:rPr lang="en-AU" sz="1400" dirty="0"/>
+              <a:t>5cmx15.21cm Placeholder Image</a:t>
+            </a:r>
+          </a:p>
+        </p:txBody>
+      </p:sp>
+      <p:grpSp>
+        <p:nvGrpSpPr>
+          <p:cNvPr id="24" name="Group 23">
+            <a:extLst>
+              <a:ext uri="{FF2B5EF4-FFF2-40B4-BE49-F238E27FC236}">
+                <a16:creationId xmlns:a16="http://schemas.microsoft.com/office/drawing/2014/main" id="{B037A4C1-C2E9-1D75-FB89-84B11A399404}"/>
+              </a:ext>
+            </a:extLst>
+          </p:cNvPr>
+          <p:cNvGrpSpPr/>
+          <p:nvPr/>
+        </p:nvGrpSpPr>
+        <p:grpSpPr>
+          <a:xfrm>
+            <a:off x="3877468" y="1073237"/>
+            <a:ext cx="4100747" cy="1531578"/>
+            <a:chOff x="3826668" y="1028787"/>
+            <a:chExt cx="4100747" cy="1531578"/>
+          </a:xfrm>
+        </p:grpSpPr>
+        <p:sp>
+          <p:nvSpPr>
+            <p:cNvPr id="2" name="TextBox 1">
+              <a:extLst>
+                <a:ext uri="{FF2B5EF4-FFF2-40B4-BE49-F238E27FC236}">
+                  <a16:creationId xmlns:a16="http://schemas.microsoft.com/office/drawing/2014/main" id="{9A8B242A-69C4-ECE6-3361-44435CE84098}"/>
+                </a:ext>
+              </a:extLst>
+            </p:cNvPr>
+            <p:cNvSpPr txBox="1"/>
+            <p:nvPr/>
+          </p:nvSpPr>
+          <p:spPr>
+            <a:xfrm>
+              <a:off x="3995271" y="1532966"/>
+              <a:ext cx="3932144" cy="523220"/>
+            </a:xfrm>
+            <a:prstGeom prst="rect">
+              <a:avLst/>
+            </a:prstGeom>
+            <a:noFill/>
+          </p:spPr>
+          <p:txBody>
+            <a:bodyPr wrap="square" rtlCol="0">
+              <a:spAutoFit/>
+            </a:bodyPr>
+            <a:lstStyle/>
+            <a:p>
+              <a:r>
+                <a:rPr lang="en-AU" sz="2800" dirty="0"/>
+                <a:t>for (i in 1:10){function}</a:t>
+              </a:r>
+            </a:p>
+          </p:txBody>
+        </p:sp>
+        <p:sp>
+          <p:nvSpPr>
+            <p:cNvPr id="3" name="Rectangle 2">
+              <a:extLst>
+                <a:ext uri="{FF2B5EF4-FFF2-40B4-BE49-F238E27FC236}">
+                  <a16:creationId xmlns:a16="http://schemas.microsoft.com/office/drawing/2014/main" id="{9379C5F0-968D-67D3-EE3D-D447DA568AAF}"/>
+                </a:ext>
+              </a:extLst>
+            </p:cNvPr>
+            <p:cNvSpPr/>
+            <p:nvPr/>
+          </p:nvSpPr>
+          <p:spPr>
+            <a:xfrm>
+              <a:off x="4673600" y="1584512"/>
+              <a:ext cx="161925" cy="423582"/>
+            </a:xfrm>
+            <a:prstGeom prst="rect">
+              <a:avLst/>
+            </a:prstGeom>
+            <a:solidFill>
+              <a:schemeClr val="accent1">
+                <a:alpha val="50196"/>
+              </a:schemeClr>
+            </a:solidFill>
+            <a:ln>
+              <a:solidFill>
+                <a:schemeClr val="accent1"/>
+              </a:solidFill>
+            </a:ln>
+          </p:spPr>
+          <p:style>
+            <a:lnRef idx="2">
+              <a:schemeClr val="accent1">
+                <a:shade val="15000"/>
+              </a:schemeClr>
+            </a:lnRef>
+            <a:fillRef idx="1">
+              <a:schemeClr val="accent1"/>
+            </a:fillRef>
+            <a:effectRef idx="0">
+              <a:schemeClr val="accent1"/>
+            </a:effectRef>
+            <a:fontRef idx="minor">
+              <a:schemeClr val="lt1"/>
+            </a:fontRef>
+          </p:style>
+          <p:txBody>
+            <a:bodyPr rtlCol="0" anchor="ctr"/>
+            <a:lstStyle/>
+            <a:p>
+              <a:pPr algn="ctr"/>
+              <a:endParaRPr lang="en-AU"/>
+            </a:p>
+          </p:txBody>
+        </p:sp>
+        <p:sp>
+          <p:nvSpPr>
+            <p:cNvPr id="4" name="Rectangle 3">
+              <a:extLst>
+                <a:ext uri="{FF2B5EF4-FFF2-40B4-BE49-F238E27FC236}">
+                  <a16:creationId xmlns:a16="http://schemas.microsoft.com/office/drawing/2014/main" id="{5AFB3544-3A60-B8A3-87EA-A06710672E78}"/>
+                </a:ext>
+              </a:extLst>
+            </p:cNvPr>
+            <p:cNvSpPr/>
+            <p:nvPr/>
+          </p:nvSpPr>
+          <p:spPr>
+            <a:xfrm>
+              <a:off x="5191124" y="1584512"/>
+              <a:ext cx="666751" cy="423582"/>
+            </a:xfrm>
+            <a:prstGeom prst="rect">
+              <a:avLst/>
+            </a:prstGeom>
+            <a:solidFill>
+              <a:schemeClr val="accent6">
+                <a:alpha val="50196"/>
+              </a:schemeClr>
+            </a:solidFill>
+            <a:ln>
+              <a:solidFill>
+                <a:schemeClr val="accent6"/>
+              </a:solidFill>
+            </a:ln>
+          </p:spPr>
+          <p:style>
+            <a:lnRef idx="2">
+              <a:schemeClr val="accent1">
+                <a:shade val="15000"/>
+              </a:schemeClr>
+            </a:lnRef>
+            <a:fillRef idx="1">
+              <a:schemeClr val="accent1"/>
+            </a:fillRef>
+            <a:effectRef idx="0">
+              <a:schemeClr val="accent1"/>
+            </a:effectRef>
+            <a:fontRef idx="minor">
+              <a:schemeClr val="lt1"/>
+            </a:fontRef>
+          </p:style>
+          <p:txBody>
+            <a:bodyPr rtlCol="0" anchor="ctr"/>
+            <a:lstStyle/>
+            <a:p>
+              <a:pPr algn="ctr"/>
+              <a:endParaRPr lang="en-AU"/>
+            </a:p>
+          </p:txBody>
+        </p:sp>
+        <p:sp>
+          <p:nvSpPr>
+            <p:cNvPr id="5" name="Rectangle 4">
+              <a:extLst>
+                <a:ext uri="{FF2B5EF4-FFF2-40B4-BE49-F238E27FC236}">
+                  <a16:creationId xmlns:a16="http://schemas.microsoft.com/office/drawing/2014/main" id="{0F88FEFE-065E-4BD9-5086-613EA16DD0F2}"/>
+                </a:ext>
+              </a:extLst>
+            </p:cNvPr>
+            <p:cNvSpPr/>
+            <p:nvPr/>
+          </p:nvSpPr>
+          <p:spPr>
+            <a:xfrm>
+              <a:off x="6064250" y="1582785"/>
+              <a:ext cx="1195911" cy="423582"/>
+            </a:xfrm>
+            <a:prstGeom prst="rect">
+              <a:avLst/>
+            </a:prstGeom>
+            <a:solidFill>
+              <a:schemeClr val="accent2">
+                <a:alpha val="50196"/>
+              </a:schemeClr>
+            </a:solidFill>
+            <a:ln>
+              <a:solidFill>
+                <a:schemeClr val="accent2"/>
+              </a:solidFill>
+            </a:ln>
+          </p:spPr>
+          <p:style>
+            <a:lnRef idx="2">
+              <a:schemeClr val="accent1">
+                <a:shade val="15000"/>
+              </a:schemeClr>
+            </a:lnRef>
+            <a:fillRef idx="1">
+              <a:schemeClr val="accent1"/>
+            </a:fillRef>
+            <a:effectRef idx="0">
+              <a:schemeClr val="accent1"/>
+            </a:effectRef>
+            <a:fontRef idx="minor">
+              <a:schemeClr val="lt1"/>
+            </a:fontRef>
+          </p:style>
+          <p:txBody>
+            <a:bodyPr rtlCol="0" anchor="ctr"/>
+            <a:lstStyle/>
+            <a:p>
+              <a:pPr algn="ctr"/>
+              <a:endParaRPr lang="en-AU"/>
+            </a:p>
+          </p:txBody>
+        </p:sp>
+        <p:sp>
+          <p:nvSpPr>
+            <p:cNvPr id="6" name="TextBox 5">
+              <a:extLst>
+                <a:ext uri="{FF2B5EF4-FFF2-40B4-BE49-F238E27FC236}">
+                  <a16:creationId xmlns:a16="http://schemas.microsoft.com/office/drawing/2014/main" id="{6E2A8547-AFCA-B4AD-0238-C5F8D274ECA9}"/>
+                </a:ext>
+              </a:extLst>
+            </p:cNvPr>
+            <p:cNvSpPr txBox="1"/>
+            <p:nvPr/>
+          </p:nvSpPr>
+          <p:spPr>
+            <a:xfrm>
+              <a:off x="4343400" y="1028787"/>
+              <a:ext cx="2362200" cy="369332"/>
+            </a:xfrm>
+            <a:prstGeom prst="rect">
+              <a:avLst/>
+            </a:prstGeom>
+            <a:noFill/>
+          </p:spPr>
+          <p:txBody>
+            <a:bodyPr wrap="square" rtlCol="0">
+              <a:spAutoFit/>
+            </a:bodyPr>
+            <a:lstStyle/>
+            <a:p>
+              <a:r>
+                <a:rPr lang="en-AU" dirty="0">
+                  <a:solidFill>
+                    <a:schemeClr val="accent6"/>
+                  </a:solidFill>
+                </a:rPr>
+                <a:t>The range to loop over.</a:t>
+              </a:r>
+            </a:p>
+          </p:txBody>
+        </p:sp>
+        <p:sp>
+          <p:nvSpPr>
+            <p:cNvPr id="7" name="TextBox 6">
+              <a:extLst>
+                <a:ext uri="{FF2B5EF4-FFF2-40B4-BE49-F238E27FC236}">
+                  <a16:creationId xmlns:a16="http://schemas.microsoft.com/office/drawing/2014/main" id="{EA5B5184-CB58-24B6-1A60-57E398BA0DCC}"/>
+                </a:ext>
+              </a:extLst>
+            </p:cNvPr>
+            <p:cNvSpPr txBox="1"/>
+            <p:nvPr/>
+          </p:nvSpPr>
+          <p:spPr>
+            <a:xfrm>
+              <a:off x="5596339" y="2191033"/>
+              <a:ext cx="2131733" cy="369332"/>
+            </a:xfrm>
+            <a:prstGeom prst="rect">
+              <a:avLst/>
+            </a:prstGeom>
+            <a:noFill/>
+          </p:spPr>
+          <p:txBody>
+            <a:bodyPr wrap="square" rtlCol="0">
+              <a:spAutoFit/>
+            </a:bodyPr>
+            <a:lstStyle/>
+            <a:p>
+              <a:r>
+                <a:rPr lang="en-AU" dirty="0">
+                  <a:solidFill>
+                    <a:schemeClr val="accent2"/>
+                  </a:solidFill>
+                </a:rPr>
+                <a:t>The thing to repeat.</a:t>
+              </a:r>
+            </a:p>
+          </p:txBody>
+        </p:sp>
+        <p:sp>
+          <p:nvSpPr>
+            <p:cNvPr id="8" name="TextBox 7">
+              <a:extLst>
+                <a:ext uri="{FF2B5EF4-FFF2-40B4-BE49-F238E27FC236}">
+                  <a16:creationId xmlns:a16="http://schemas.microsoft.com/office/drawing/2014/main" id="{CDCD0F40-C260-D176-BF4A-C503468091CC}"/>
+                </a:ext>
+              </a:extLst>
+            </p:cNvPr>
+            <p:cNvSpPr txBox="1"/>
+            <p:nvPr/>
+          </p:nvSpPr>
+          <p:spPr>
+            <a:xfrm>
+              <a:off x="3826668" y="2191033"/>
+              <a:ext cx="1855788" cy="369332"/>
+            </a:xfrm>
+            <a:prstGeom prst="rect">
+              <a:avLst/>
+            </a:prstGeom>
+            <a:noFill/>
+          </p:spPr>
+          <p:txBody>
+            <a:bodyPr wrap="square" rtlCol="0">
+              <a:spAutoFit/>
+            </a:bodyPr>
+            <a:lstStyle/>
+            <a:p>
+              <a:r>
+                <a:rPr lang="en-AU" dirty="0">
+                  <a:solidFill>
+                    <a:schemeClr val="accent1"/>
+                  </a:solidFill>
+                </a:rPr>
+                <a:t>The current loop.</a:t>
+              </a:r>
+            </a:p>
+          </p:txBody>
+        </p:sp>
+        <p:cxnSp>
+          <p:nvCxnSpPr>
+            <p:cNvPr id="10" name="Straight Arrow Connector 9">
+              <a:extLst>
+                <a:ext uri="{FF2B5EF4-FFF2-40B4-BE49-F238E27FC236}">
+                  <a16:creationId xmlns:a16="http://schemas.microsoft.com/office/drawing/2014/main" id="{A54A53A5-7D07-E2DB-7B32-88A7F7BD0E62}"/>
+                </a:ext>
+              </a:extLst>
+            </p:cNvPr>
+            <p:cNvCxnSpPr>
+              <a:cxnSpLocks/>
+              <a:stCxn id="8" idx="0"/>
+              <a:endCxn id="3" idx="2"/>
+            </p:cNvCxnSpPr>
+            <p:nvPr/>
+          </p:nvCxnSpPr>
+          <p:spPr>
+            <a:xfrm flipV="1">
+              <a:off x="4754562" y="2008094"/>
+              <a:ext cx="1" cy="230281"/>
+            </a:xfrm>
+            <a:prstGeom prst="straightConnector1">
+              <a:avLst/>
+            </a:prstGeom>
+            <a:ln w="38100">
+              <a:solidFill>
+                <a:schemeClr val="accent1"/>
+              </a:solidFill>
+              <a:tailEnd type="triangle"/>
+            </a:ln>
+          </p:spPr>
+          <p:style>
+            <a:lnRef idx="1">
+              <a:schemeClr val="accent1"/>
+            </a:lnRef>
+            <a:fillRef idx="0">
+              <a:schemeClr val="accent1"/>
+            </a:fillRef>
+            <a:effectRef idx="0">
+              <a:schemeClr val="accent1"/>
+            </a:effectRef>
+            <a:fontRef idx="minor">
+              <a:schemeClr val="tx1"/>
+            </a:fontRef>
+          </p:style>
+        </p:cxnSp>
+        <p:cxnSp>
+          <p:nvCxnSpPr>
+            <p:cNvPr id="11" name="Straight Arrow Connector 10">
+              <a:extLst>
+                <a:ext uri="{FF2B5EF4-FFF2-40B4-BE49-F238E27FC236}">
+                  <a16:creationId xmlns:a16="http://schemas.microsoft.com/office/drawing/2014/main" id="{C2C5402B-C90C-ECF3-6464-D24228999892}"/>
+                </a:ext>
+              </a:extLst>
+            </p:cNvPr>
+            <p:cNvCxnSpPr>
+              <a:cxnSpLocks/>
+              <a:stCxn id="7" idx="0"/>
+              <a:endCxn id="5" idx="2"/>
+            </p:cNvCxnSpPr>
+            <p:nvPr/>
+          </p:nvCxnSpPr>
+          <p:spPr>
+            <a:xfrm flipV="1">
+              <a:off x="6662206" y="2006367"/>
+              <a:ext cx="0" cy="260582"/>
+            </a:xfrm>
+            <a:prstGeom prst="straightConnector1">
+              <a:avLst/>
+            </a:prstGeom>
+            <a:ln w="38100">
+              <a:solidFill>
+                <a:schemeClr val="accent2"/>
+              </a:solidFill>
+              <a:tailEnd type="triangle"/>
+            </a:ln>
+          </p:spPr>
+          <p:style>
+            <a:lnRef idx="1">
+              <a:schemeClr val="accent1"/>
+            </a:lnRef>
+            <a:fillRef idx="0">
+              <a:schemeClr val="accent1"/>
+            </a:fillRef>
+            <a:effectRef idx="0">
+              <a:schemeClr val="accent1"/>
+            </a:effectRef>
+            <a:fontRef idx="minor">
+              <a:schemeClr val="tx1"/>
+            </a:fontRef>
+          </p:style>
+        </p:cxnSp>
+        <p:cxnSp>
+          <p:nvCxnSpPr>
+            <p:cNvPr id="12" name="Straight Arrow Connector 11">
+              <a:extLst>
+                <a:ext uri="{FF2B5EF4-FFF2-40B4-BE49-F238E27FC236}">
+                  <a16:creationId xmlns:a16="http://schemas.microsoft.com/office/drawing/2014/main" id="{A6E99A9E-2695-29E9-AE9C-D8808F403EF8}"/>
+                </a:ext>
+              </a:extLst>
+            </p:cNvPr>
+            <p:cNvCxnSpPr>
+              <a:cxnSpLocks/>
+              <a:stCxn id="6" idx="2"/>
+              <a:endCxn id="4" idx="0"/>
+            </p:cNvCxnSpPr>
+            <p:nvPr/>
+          </p:nvCxnSpPr>
+          <p:spPr>
+            <a:xfrm>
+              <a:off x="5524500" y="1346200"/>
+              <a:ext cx="0" cy="238312"/>
+            </a:xfrm>
+            <a:prstGeom prst="straightConnector1">
+              <a:avLst/>
+            </a:prstGeom>
+            <a:ln w="38100">
+              <a:solidFill>
+                <a:schemeClr val="accent6"/>
+              </a:solidFill>
+              <a:tailEnd type="triangle"/>
+            </a:ln>
+          </p:spPr>
+          <p:style>
+            <a:lnRef idx="1">
+              <a:schemeClr val="accent1"/>
+            </a:lnRef>
+            <a:fillRef idx="0">
+              <a:schemeClr val="accent1"/>
+            </a:fillRef>
+            <a:effectRef idx="0">
+              <a:schemeClr val="accent1"/>
+            </a:effectRef>
+            <a:fontRef idx="minor">
+              <a:schemeClr val="tx1"/>
+            </a:fontRef>
+          </p:style>
+        </p:cxnSp>
+      </p:grpSp>
+    </p:spTree>
+    <p:extLst>
+      <p:ext uri="{BB962C8B-B14F-4D97-AF65-F5344CB8AC3E}">
+        <p14:creationId xmlns:p14="http://schemas.microsoft.com/office/powerpoint/2010/main" val="1594896056"/>
+      </p:ext>
+    </p:extLst>
+  </p:cSld>
+  <p:clrMapOvr>
+    <a:masterClrMapping/>
+  </p:clrMapOvr>
+</p:sld>
+</file>
+
 <file path=ppt/theme/theme1.xml><?xml version="1.0" encoding="utf-8"?>
 <a:theme xmlns:a="http://schemas.openxmlformats.org/drawingml/2006/main" name="Office Theme">
   <a:themeElements>

</xml_diff>

<commit_message>
Start vectorised function blog
</commit_message>
<xml_diff>
--- a/docs/images/listing_images.pptx
+++ b/docs/images/listing_images.pptx
@@ -12,6 +12,7 @@
     <p:sldId id="262" r:id="rId6"/>
     <p:sldId id="264" r:id="rId7"/>
     <p:sldId id="263" r:id="rId8"/>
+    <p:sldId id="265" r:id="rId9"/>
   </p:sldIdLst>
   <p:sldSz cx="12192000" cy="6858000"/>
   <p:notesSz cx="6858000" cy="9144000"/>
@@ -267,7 +268,7 @@
           <a:p>
             <a:fld id="{D66A3454-FE8B-43FF-A5CF-11748C0C9FCF}" type="datetimeFigureOut">
               <a:rPr lang="en-AU" smtClean="0"/>
-              <a:t>3/05/2025</a:t>
+              <a:t>9/05/2025</a:t>
             </a:fld>
             <a:endParaRPr lang="en-AU"/>
           </a:p>
@@ -467,7 +468,7 @@
           <a:p>
             <a:fld id="{D66A3454-FE8B-43FF-A5CF-11748C0C9FCF}" type="datetimeFigureOut">
               <a:rPr lang="en-AU" smtClean="0"/>
-              <a:t>3/05/2025</a:t>
+              <a:t>9/05/2025</a:t>
             </a:fld>
             <a:endParaRPr lang="en-AU"/>
           </a:p>
@@ -677,7 +678,7 @@
           <a:p>
             <a:fld id="{D66A3454-FE8B-43FF-A5CF-11748C0C9FCF}" type="datetimeFigureOut">
               <a:rPr lang="en-AU" smtClean="0"/>
-              <a:t>3/05/2025</a:t>
+              <a:t>9/05/2025</a:t>
             </a:fld>
             <a:endParaRPr lang="en-AU"/>
           </a:p>
@@ -877,7 +878,7 @@
           <a:p>
             <a:fld id="{D66A3454-FE8B-43FF-A5CF-11748C0C9FCF}" type="datetimeFigureOut">
               <a:rPr lang="en-AU" smtClean="0"/>
-              <a:t>3/05/2025</a:t>
+              <a:t>9/05/2025</a:t>
             </a:fld>
             <a:endParaRPr lang="en-AU"/>
           </a:p>
@@ -1153,7 +1154,7 @@
           <a:p>
             <a:fld id="{D66A3454-FE8B-43FF-A5CF-11748C0C9FCF}" type="datetimeFigureOut">
               <a:rPr lang="en-AU" smtClean="0"/>
-              <a:t>3/05/2025</a:t>
+              <a:t>9/05/2025</a:t>
             </a:fld>
             <a:endParaRPr lang="en-AU"/>
           </a:p>
@@ -1421,7 +1422,7 @@
           <a:p>
             <a:fld id="{D66A3454-FE8B-43FF-A5CF-11748C0C9FCF}" type="datetimeFigureOut">
               <a:rPr lang="en-AU" smtClean="0"/>
-              <a:t>3/05/2025</a:t>
+              <a:t>9/05/2025</a:t>
             </a:fld>
             <a:endParaRPr lang="en-AU"/>
           </a:p>
@@ -1836,7 +1837,7 @@
           <a:p>
             <a:fld id="{D66A3454-FE8B-43FF-A5CF-11748C0C9FCF}" type="datetimeFigureOut">
               <a:rPr lang="en-AU" smtClean="0"/>
-              <a:t>3/05/2025</a:t>
+              <a:t>9/05/2025</a:t>
             </a:fld>
             <a:endParaRPr lang="en-AU"/>
           </a:p>
@@ -1978,7 +1979,7 @@
           <a:p>
             <a:fld id="{D66A3454-FE8B-43FF-A5CF-11748C0C9FCF}" type="datetimeFigureOut">
               <a:rPr lang="en-AU" smtClean="0"/>
-              <a:t>3/05/2025</a:t>
+              <a:t>9/05/2025</a:t>
             </a:fld>
             <a:endParaRPr lang="en-AU"/>
           </a:p>
@@ -2091,7 +2092,7 @@
           <a:p>
             <a:fld id="{D66A3454-FE8B-43FF-A5CF-11748C0C9FCF}" type="datetimeFigureOut">
               <a:rPr lang="en-AU" smtClean="0"/>
-              <a:t>3/05/2025</a:t>
+              <a:t>9/05/2025</a:t>
             </a:fld>
             <a:endParaRPr lang="en-AU"/>
           </a:p>
@@ -2404,7 +2405,7 @@
           <a:p>
             <a:fld id="{D66A3454-FE8B-43FF-A5CF-11748C0C9FCF}" type="datetimeFigureOut">
               <a:rPr lang="en-AU" smtClean="0"/>
-              <a:t>3/05/2025</a:t>
+              <a:t>9/05/2025</a:t>
             </a:fld>
             <a:endParaRPr lang="en-AU"/>
           </a:p>
@@ -2693,7 +2694,7 @@
           <a:p>
             <a:fld id="{D66A3454-FE8B-43FF-A5CF-11748C0C9FCF}" type="datetimeFigureOut">
               <a:rPr lang="en-AU" smtClean="0"/>
-              <a:t>3/05/2025</a:t>
+              <a:t>9/05/2025</a:t>
             </a:fld>
             <a:endParaRPr lang="en-AU"/>
           </a:p>
@@ -2936,7 +2937,7 @@
           <a:p>
             <a:fld id="{D66A3454-FE8B-43FF-A5CF-11748C0C9FCF}" type="datetimeFigureOut">
               <a:rPr lang="en-AU" smtClean="0"/>
-              <a:t>3/05/2025</a:t>
+              <a:t>9/05/2025</a:t>
             </a:fld>
             <a:endParaRPr lang="en-AU"/>
           </a:p>
@@ -12341,6 +12342,1207 @@
 </p:sld>
 </file>
 
+<file path=ppt/slides/slide8.xml><?xml version="1.0" encoding="utf-8"?>
+<p:sld xmlns:a="http://schemas.openxmlformats.org/drawingml/2006/main" xmlns:r="http://schemas.openxmlformats.org/officeDocument/2006/relationships" xmlns:p="http://schemas.openxmlformats.org/presentationml/2006/main">
+  <p:cSld>
+    <p:spTree>
+      <p:nvGrpSpPr>
+        <p:cNvPr id="1" name="">
+          <a:extLst>
+            <a:ext uri="{FF2B5EF4-FFF2-40B4-BE49-F238E27FC236}">
+              <a16:creationId xmlns:a16="http://schemas.microsoft.com/office/drawing/2014/main" id="{C310F163-554A-F5EB-9A57-1D5206E4BEA6}"/>
+            </a:ext>
+          </a:extLst>
+        </p:cNvPr>
+        <p:cNvGrpSpPr/>
+        <p:nvPr/>
+      </p:nvGrpSpPr>
+      <p:grpSpPr>
+        <a:xfrm>
+          <a:off x="0" y="0"/>
+          <a:ext cx="0" cy="0"/>
+          <a:chOff x="0" y="0"/>
+          <a:chExt cx="0" cy="0"/>
+        </a:xfrm>
+      </p:grpSpPr>
+      <p:sp>
+        <p:nvSpPr>
+          <p:cNvPr id="16" name="Rectangle 15">
+            <a:extLst>
+              <a:ext uri="{FF2B5EF4-FFF2-40B4-BE49-F238E27FC236}">
+                <a16:creationId xmlns:a16="http://schemas.microsoft.com/office/drawing/2014/main" id="{01DF7E2C-FF1A-F463-2D1D-A9F044E4C470}"/>
+              </a:ext>
+            </a:extLst>
+          </p:cNvPr>
+          <p:cNvSpPr/>
+          <p:nvPr/>
+        </p:nvSpPr>
+        <p:spPr>
+          <a:xfrm>
+            <a:off x="3326450" y="4396721"/>
+            <a:ext cx="5475600" cy="1800000"/>
+          </a:xfrm>
+          <a:prstGeom prst="rect">
+            <a:avLst/>
+          </a:prstGeom>
+          <a:solidFill>
+            <a:srgbClr val="00252A"/>
+          </a:solidFill>
+        </p:spPr>
+        <p:style>
+          <a:lnRef idx="2">
+            <a:schemeClr val="accent1">
+              <a:shade val="15000"/>
+            </a:schemeClr>
+          </a:lnRef>
+          <a:fillRef idx="1">
+            <a:schemeClr val="accent1"/>
+          </a:fillRef>
+          <a:effectRef idx="0">
+            <a:schemeClr val="accent1"/>
+          </a:effectRef>
+          <a:fontRef idx="minor">
+            <a:schemeClr val="lt1"/>
+          </a:fontRef>
+        </p:style>
+        <p:txBody>
+          <a:bodyPr rtlCol="0" anchor="ctr"/>
+          <a:lstStyle/>
+          <a:p>
+            <a:pPr algn="ctr"/>
+            <a:r>
+              <a:rPr lang="en-AU" sz="1400" dirty="0"/>
+              <a:t>5cmx15.21cm Placeholder Image</a:t>
+            </a:r>
+          </a:p>
+        </p:txBody>
+      </p:sp>
+      <p:grpSp>
+        <p:nvGrpSpPr>
+          <p:cNvPr id="91" name="Group 90">
+            <a:extLst>
+              <a:ext uri="{FF2B5EF4-FFF2-40B4-BE49-F238E27FC236}">
+                <a16:creationId xmlns:a16="http://schemas.microsoft.com/office/drawing/2014/main" id="{3F9F8834-E535-9488-A643-1CCC25196A94}"/>
+              </a:ext>
+            </a:extLst>
+          </p:cNvPr>
+          <p:cNvGrpSpPr>
+            <a:grpSpLocks noChangeAspect="1"/>
+          </p:cNvGrpSpPr>
+          <p:nvPr/>
+        </p:nvGrpSpPr>
+        <p:grpSpPr>
+          <a:xfrm>
+            <a:off x="2211970" y="742271"/>
+            <a:ext cx="7704560" cy="2485282"/>
+            <a:chOff x="1621364" y="722100"/>
+            <a:chExt cx="7704560" cy="2485282"/>
+          </a:xfrm>
+        </p:grpSpPr>
+        <p:sp>
+          <p:nvSpPr>
+            <p:cNvPr id="2" name="TextBox 1">
+              <a:extLst>
+                <a:ext uri="{FF2B5EF4-FFF2-40B4-BE49-F238E27FC236}">
+                  <a16:creationId xmlns:a16="http://schemas.microsoft.com/office/drawing/2014/main" id="{D7248423-0A1C-486A-AEDE-04A7A7F1C7F4}"/>
+                </a:ext>
+              </a:extLst>
+            </p:cNvPr>
+            <p:cNvSpPr txBox="1"/>
+            <p:nvPr/>
+          </p:nvSpPr>
+          <p:spPr>
+            <a:xfrm>
+              <a:off x="1621364" y="1415514"/>
+              <a:ext cx="4019076" cy="369332"/>
+            </a:xfrm>
+            <a:prstGeom prst="rect">
+              <a:avLst/>
+            </a:prstGeom>
+            <a:noFill/>
+          </p:spPr>
+          <p:txBody>
+            <a:bodyPr wrap="square" rtlCol="0">
+              <a:spAutoFit/>
+            </a:bodyPr>
+            <a:lstStyle/>
+            <a:p>
+              <a:pPr algn="ctr"/>
+              <a:r>
+                <a:rPr lang="en-AU" dirty="0">
+                  <a:solidFill>
+                    <a:srgbClr val="E6AA04"/>
+                  </a:solidFill>
+                </a:rPr>
+                <a:t>function_name &lt;- function(inputs){code} </a:t>
+              </a:r>
+            </a:p>
+          </p:txBody>
+        </p:sp>
+        <p:sp>
+          <p:nvSpPr>
+            <p:cNvPr id="3" name="TextBox 2">
+              <a:extLst>
+                <a:ext uri="{FF2B5EF4-FFF2-40B4-BE49-F238E27FC236}">
+                  <a16:creationId xmlns:a16="http://schemas.microsoft.com/office/drawing/2014/main" id="{9F5568A5-BF2B-5D9E-37FC-30BB2252ED58}"/>
+                </a:ext>
+              </a:extLst>
+            </p:cNvPr>
+            <p:cNvSpPr txBox="1"/>
+            <p:nvPr/>
+          </p:nvSpPr>
+          <p:spPr>
+            <a:xfrm>
+              <a:off x="6863599" y="1239396"/>
+              <a:ext cx="1742275" cy="369332"/>
+            </a:xfrm>
+            <a:prstGeom prst="rect">
+              <a:avLst/>
+            </a:prstGeom>
+            <a:noFill/>
+          </p:spPr>
+          <p:txBody>
+            <a:bodyPr wrap="square" rtlCol="0">
+              <a:spAutoFit/>
+            </a:bodyPr>
+            <a:lstStyle/>
+            <a:p>
+              <a:r>
+                <a:rPr lang="en-AU" dirty="0">
+                  <a:solidFill>
+                    <a:srgbClr val="8E3B46"/>
+                  </a:solidFill>
+                </a:rPr>
+                <a:t>map(                )</a:t>
+              </a:r>
+            </a:p>
+          </p:txBody>
+        </p:sp>
+        <p:sp>
+          <p:nvSpPr>
+            <p:cNvPr id="5" name="TextBox 4">
+              <a:extLst>
+                <a:ext uri="{FF2B5EF4-FFF2-40B4-BE49-F238E27FC236}">
+                  <a16:creationId xmlns:a16="http://schemas.microsoft.com/office/drawing/2014/main" id="{EFE5E349-0CBE-E45F-F559-9A4ADE69BF46}"/>
+                </a:ext>
+              </a:extLst>
+            </p:cNvPr>
+            <p:cNvSpPr txBox="1"/>
+            <p:nvPr/>
+          </p:nvSpPr>
+          <p:spPr>
+            <a:xfrm>
+              <a:off x="6863598" y="2663448"/>
+              <a:ext cx="2359349" cy="369332"/>
+            </a:xfrm>
+            <a:prstGeom prst="rect">
+              <a:avLst/>
+            </a:prstGeom>
+            <a:noFill/>
+          </p:spPr>
+          <p:txBody>
+            <a:bodyPr wrap="square" rtlCol="0">
+              <a:spAutoFit/>
+            </a:bodyPr>
+            <a:lstStyle/>
+            <a:p>
+              <a:r>
+                <a:rPr lang="en-AU" dirty="0">
+                  <a:solidFill>
+                    <a:srgbClr val="8E3B46"/>
+                  </a:solidFill>
+                </a:rPr>
+                <a:t>for (i in 1:10)</a:t>
+              </a:r>
+              <a:r>
+                <a:rPr lang="en-AU" dirty="0">
+                  <a:solidFill>
+                    <a:srgbClr val="E6AA04"/>
+                  </a:solidFill>
+                </a:rPr>
+                <a:t>{“func”}</a:t>
+              </a:r>
+            </a:p>
+          </p:txBody>
+        </p:sp>
+        <p:sp>
+          <p:nvSpPr>
+            <p:cNvPr id="6" name="TextBox 5">
+              <a:extLst>
+                <a:ext uri="{FF2B5EF4-FFF2-40B4-BE49-F238E27FC236}">
+                  <a16:creationId xmlns:a16="http://schemas.microsoft.com/office/drawing/2014/main" id="{21A4518D-99DD-3EA4-5EBF-CB31FF2FF0E8}"/>
+                </a:ext>
+              </a:extLst>
+            </p:cNvPr>
+            <p:cNvSpPr txBox="1"/>
+            <p:nvPr/>
+          </p:nvSpPr>
+          <p:spPr>
+            <a:xfrm>
+              <a:off x="4004304" y="1928844"/>
+              <a:ext cx="1847002" cy="369332"/>
+            </a:xfrm>
+            <a:prstGeom prst="rect">
+              <a:avLst/>
+            </a:prstGeom>
+            <a:noFill/>
+          </p:spPr>
+          <p:txBody>
+            <a:bodyPr wrap="square" rtlCol="0">
+              <a:spAutoFit/>
+            </a:bodyPr>
+            <a:lstStyle/>
+            <a:p>
+              <a:pPr algn="ctr"/>
+              <a:r>
+                <a:rPr lang="en-AU" dirty="0">
+                  <a:solidFill>
+                    <a:srgbClr val="E6AA04"/>
+                  </a:solidFill>
+                </a:rPr>
+                <a:t>“func” (for short)</a:t>
+              </a:r>
+            </a:p>
+          </p:txBody>
+        </p:sp>
+        <p:sp>
+          <p:nvSpPr>
+            <p:cNvPr id="17" name="TextBox 16">
+              <a:extLst>
+                <a:ext uri="{FF2B5EF4-FFF2-40B4-BE49-F238E27FC236}">
+                  <a16:creationId xmlns:a16="http://schemas.microsoft.com/office/drawing/2014/main" id="{685BF3A8-C112-C7C4-5A25-D1BEEBEF8B51}"/>
+                </a:ext>
+              </a:extLst>
+            </p:cNvPr>
+            <p:cNvSpPr txBox="1"/>
+            <p:nvPr/>
+          </p:nvSpPr>
+          <p:spPr>
+            <a:xfrm>
+              <a:off x="7443450" y="722100"/>
+              <a:ext cx="800474" cy="369332"/>
+            </a:xfrm>
+            <a:prstGeom prst="rect">
+              <a:avLst/>
+            </a:prstGeom>
+            <a:noFill/>
+          </p:spPr>
+          <p:txBody>
+            <a:bodyPr wrap="square" rtlCol="0">
+              <a:spAutoFit/>
+            </a:bodyPr>
+            <a:lstStyle/>
+            <a:p>
+              <a:pPr algn="ctr"/>
+              <a:r>
+                <a:rPr lang="en-AU" dirty="0">
+                  <a:solidFill>
+                    <a:srgbClr val="E6AA04"/>
+                  </a:solidFill>
+                </a:rPr>
+                <a:t>“func”</a:t>
+              </a:r>
+            </a:p>
+          </p:txBody>
+        </p:sp>
+        <p:sp>
+          <p:nvSpPr>
+            <p:cNvPr id="18" name="TextBox 17">
+              <a:extLst>
+                <a:ext uri="{FF2B5EF4-FFF2-40B4-BE49-F238E27FC236}">
+                  <a16:creationId xmlns:a16="http://schemas.microsoft.com/office/drawing/2014/main" id="{FB04040B-E605-5C03-B276-CF5AECBC15A5}"/>
+                </a:ext>
+              </a:extLst>
+            </p:cNvPr>
+            <p:cNvSpPr txBox="1"/>
+            <p:nvPr/>
+          </p:nvSpPr>
+          <p:spPr>
+            <a:xfrm>
+              <a:off x="7443450" y="926540"/>
+              <a:ext cx="800474" cy="369332"/>
+            </a:xfrm>
+            <a:prstGeom prst="rect">
+              <a:avLst/>
+            </a:prstGeom>
+            <a:noFill/>
+          </p:spPr>
+          <p:txBody>
+            <a:bodyPr wrap="square" rtlCol="0">
+              <a:spAutoFit/>
+            </a:bodyPr>
+            <a:lstStyle/>
+            <a:p>
+              <a:pPr algn="ctr"/>
+              <a:r>
+                <a:rPr lang="en-AU" dirty="0">
+                  <a:solidFill>
+                    <a:srgbClr val="E6AA04"/>
+                  </a:solidFill>
+                </a:rPr>
+                <a:t>“func”</a:t>
+              </a:r>
+            </a:p>
+          </p:txBody>
+        </p:sp>
+        <p:sp>
+          <p:nvSpPr>
+            <p:cNvPr id="19" name="TextBox 18">
+              <a:extLst>
+                <a:ext uri="{FF2B5EF4-FFF2-40B4-BE49-F238E27FC236}">
+                  <a16:creationId xmlns:a16="http://schemas.microsoft.com/office/drawing/2014/main" id="{CF976D97-8A4E-2D8C-41E7-4F5942410DDE}"/>
+                </a:ext>
+              </a:extLst>
+            </p:cNvPr>
+            <p:cNvSpPr txBox="1"/>
+            <p:nvPr/>
+          </p:nvSpPr>
+          <p:spPr>
+            <a:xfrm>
+              <a:off x="7443450" y="1135279"/>
+              <a:ext cx="800474" cy="369332"/>
+            </a:xfrm>
+            <a:prstGeom prst="rect">
+              <a:avLst/>
+            </a:prstGeom>
+            <a:noFill/>
+          </p:spPr>
+          <p:txBody>
+            <a:bodyPr wrap="square" rtlCol="0">
+              <a:spAutoFit/>
+            </a:bodyPr>
+            <a:lstStyle/>
+            <a:p>
+              <a:pPr algn="ctr"/>
+              <a:r>
+                <a:rPr lang="en-AU" dirty="0">
+                  <a:solidFill>
+                    <a:srgbClr val="E6AA04"/>
+                  </a:solidFill>
+                </a:rPr>
+                <a:t>“func”</a:t>
+              </a:r>
+            </a:p>
+          </p:txBody>
+        </p:sp>
+        <p:sp>
+          <p:nvSpPr>
+            <p:cNvPr id="20" name="TextBox 19">
+              <a:extLst>
+                <a:ext uri="{FF2B5EF4-FFF2-40B4-BE49-F238E27FC236}">
+                  <a16:creationId xmlns:a16="http://schemas.microsoft.com/office/drawing/2014/main" id="{A8C4ED06-3C6C-0CF8-34FE-9ACB3713F0E2}"/>
+                </a:ext>
+              </a:extLst>
+            </p:cNvPr>
+            <p:cNvSpPr txBox="1"/>
+            <p:nvPr/>
+          </p:nvSpPr>
+          <p:spPr>
+            <a:xfrm>
+              <a:off x="7443450" y="1340529"/>
+              <a:ext cx="800474" cy="369332"/>
+            </a:xfrm>
+            <a:prstGeom prst="rect">
+              <a:avLst/>
+            </a:prstGeom>
+            <a:noFill/>
+          </p:spPr>
+          <p:txBody>
+            <a:bodyPr wrap="square" rtlCol="0">
+              <a:spAutoFit/>
+            </a:bodyPr>
+            <a:lstStyle/>
+            <a:p>
+              <a:pPr algn="ctr"/>
+              <a:r>
+                <a:rPr lang="en-AU" dirty="0">
+                  <a:solidFill>
+                    <a:srgbClr val="E6AA04"/>
+                  </a:solidFill>
+                </a:rPr>
+                <a:t>“func”</a:t>
+              </a:r>
+            </a:p>
+          </p:txBody>
+        </p:sp>
+        <p:sp>
+          <p:nvSpPr>
+            <p:cNvPr id="21" name="TextBox 20">
+              <a:extLst>
+                <a:ext uri="{FF2B5EF4-FFF2-40B4-BE49-F238E27FC236}">
+                  <a16:creationId xmlns:a16="http://schemas.microsoft.com/office/drawing/2014/main" id="{907D51EA-D0F3-AD4C-CA11-F48032FB8D2C}"/>
+                </a:ext>
+              </a:extLst>
+            </p:cNvPr>
+            <p:cNvSpPr txBox="1"/>
+            <p:nvPr/>
+          </p:nvSpPr>
+          <p:spPr>
+            <a:xfrm>
+              <a:off x="7443450" y="1550079"/>
+              <a:ext cx="800474" cy="369332"/>
+            </a:xfrm>
+            <a:prstGeom prst="rect">
+              <a:avLst/>
+            </a:prstGeom>
+            <a:noFill/>
+          </p:spPr>
+          <p:txBody>
+            <a:bodyPr wrap="square" rtlCol="0">
+              <a:spAutoFit/>
+            </a:bodyPr>
+            <a:lstStyle/>
+            <a:p>
+              <a:pPr algn="ctr"/>
+              <a:r>
+                <a:rPr lang="en-AU" dirty="0">
+                  <a:solidFill>
+                    <a:srgbClr val="E6AA04"/>
+                  </a:solidFill>
+                </a:rPr>
+                <a:t>“func”</a:t>
+              </a:r>
+            </a:p>
+          </p:txBody>
+        </p:sp>
+        <p:sp>
+          <p:nvSpPr>
+            <p:cNvPr id="22" name="TextBox 21">
+              <a:extLst>
+                <a:ext uri="{FF2B5EF4-FFF2-40B4-BE49-F238E27FC236}">
+                  <a16:creationId xmlns:a16="http://schemas.microsoft.com/office/drawing/2014/main" id="{BAD7B2A2-F6F4-8A81-50DB-A61DCD59E7FD}"/>
+                </a:ext>
+              </a:extLst>
+            </p:cNvPr>
+            <p:cNvSpPr txBox="1"/>
+            <p:nvPr/>
+          </p:nvSpPr>
+          <p:spPr>
+            <a:xfrm>
+              <a:off x="7443450" y="1752932"/>
+              <a:ext cx="800474" cy="369332"/>
+            </a:xfrm>
+            <a:prstGeom prst="rect">
+              <a:avLst/>
+            </a:prstGeom>
+            <a:noFill/>
+          </p:spPr>
+          <p:txBody>
+            <a:bodyPr wrap="square" rtlCol="0">
+              <a:spAutoFit/>
+            </a:bodyPr>
+            <a:lstStyle/>
+            <a:p>
+              <a:pPr algn="ctr"/>
+              <a:r>
+                <a:rPr lang="en-AU" dirty="0">
+                  <a:solidFill>
+                    <a:srgbClr val="E6AA04"/>
+                  </a:solidFill>
+                </a:rPr>
+                <a:t>“func”</a:t>
+              </a:r>
+            </a:p>
+          </p:txBody>
+        </p:sp>
+        <p:cxnSp>
+          <p:nvCxnSpPr>
+            <p:cNvPr id="26" name="Straight Arrow Connector 25">
+              <a:extLst>
+                <a:ext uri="{FF2B5EF4-FFF2-40B4-BE49-F238E27FC236}">
+                  <a16:creationId xmlns:a16="http://schemas.microsoft.com/office/drawing/2014/main" id="{80EC0D0D-534D-AC2E-C0AB-0D4E24AA16CC}"/>
+                </a:ext>
+              </a:extLst>
+            </p:cNvPr>
+            <p:cNvCxnSpPr>
+              <a:cxnSpLocks/>
+            </p:cNvCxnSpPr>
+            <p:nvPr/>
+          </p:nvCxnSpPr>
+          <p:spPr>
+            <a:xfrm>
+              <a:off x="8497923" y="902237"/>
+              <a:ext cx="828000" cy="0"/>
+            </a:xfrm>
+            <a:prstGeom prst="straightConnector1">
+              <a:avLst/>
+            </a:prstGeom>
+            <a:ln w="38100">
+              <a:solidFill>
+                <a:srgbClr val="00252A"/>
+              </a:solidFill>
+              <a:tailEnd type="triangle"/>
+            </a:ln>
+          </p:spPr>
+          <p:style>
+            <a:lnRef idx="1">
+              <a:schemeClr val="accent1"/>
+            </a:lnRef>
+            <a:fillRef idx="0">
+              <a:schemeClr val="accent1"/>
+            </a:fillRef>
+            <a:effectRef idx="0">
+              <a:schemeClr val="accent1"/>
+            </a:effectRef>
+            <a:fontRef idx="minor">
+              <a:schemeClr val="tx1"/>
+            </a:fontRef>
+          </p:style>
+        </p:cxnSp>
+        <p:cxnSp>
+          <p:nvCxnSpPr>
+            <p:cNvPr id="27" name="Straight Arrow Connector 26">
+              <a:extLst>
+                <a:ext uri="{FF2B5EF4-FFF2-40B4-BE49-F238E27FC236}">
+                  <a16:creationId xmlns:a16="http://schemas.microsoft.com/office/drawing/2014/main" id="{B44D1C56-EB0A-455A-F1FF-507FBD1C3BD1}"/>
+                </a:ext>
+              </a:extLst>
+            </p:cNvPr>
+            <p:cNvCxnSpPr>
+              <a:cxnSpLocks/>
+            </p:cNvCxnSpPr>
+            <p:nvPr/>
+          </p:nvCxnSpPr>
+          <p:spPr>
+            <a:xfrm>
+              <a:off x="8497924" y="1106677"/>
+              <a:ext cx="828000" cy="0"/>
+            </a:xfrm>
+            <a:prstGeom prst="straightConnector1">
+              <a:avLst/>
+            </a:prstGeom>
+            <a:ln w="38100">
+              <a:solidFill>
+                <a:srgbClr val="00252A"/>
+              </a:solidFill>
+              <a:tailEnd type="triangle"/>
+            </a:ln>
+          </p:spPr>
+          <p:style>
+            <a:lnRef idx="1">
+              <a:schemeClr val="accent1"/>
+            </a:lnRef>
+            <a:fillRef idx="0">
+              <a:schemeClr val="accent1"/>
+            </a:fillRef>
+            <a:effectRef idx="0">
+              <a:schemeClr val="accent1"/>
+            </a:effectRef>
+            <a:fontRef idx="minor">
+              <a:schemeClr val="tx1"/>
+            </a:fontRef>
+          </p:style>
+        </p:cxnSp>
+        <p:cxnSp>
+          <p:nvCxnSpPr>
+            <p:cNvPr id="29" name="Straight Arrow Connector 28">
+              <a:extLst>
+                <a:ext uri="{FF2B5EF4-FFF2-40B4-BE49-F238E27FC236}">
+                  <a16:creationId xmlns:a16="http://schemas.microsoft.com/office/drawing/2014/main" id="{C598AC3A-A9E6-0C1F-8352-22887D61DB72}"/>
+                </a:ext>
+              </a:extLst>
+            </p:cNvPr>
+            <p:cNvCxnSpPr>
+              <a:cxnSpLocks/>
+            </p:cNvCxnSpPr>
+            <p:nvPr/>
+          </p:nvCxnSpPr>
+          <p:spPr>
+            <a:xfrm>
+              <a:off x="8497924" y="1315416"/>
+              <a:ext cx="828000" cy="0"/>
+            </a:xfrm>
+            <a:prstGeom prst="straightConnector1">
+              <a:avLst/>
+            </a:prstGeom>
+            <a:ln w="38100">
+              <a:solidFill>
+                <a:srgbClr val="00252A"/>
+              </a:solidFill>
+              <a:tailEnd type="triangle"/>
+            </a:ln>
+          </p:spPr>
+          <p:style>
+            <a:lnRef idx="1">
+              <a:schemeClr val="accent1"/>
+            </a:lnRef>
+            <a:fillRef idx="0">
+              <a:schemeClr val="accent1"/>
+            </a:fillRef>
+            <a:effectRef idx="0">
+              <a:schemeClr val="accent1"/>
+            </a:effectRef>
+            <a:fontRef idx="minor">
+              <a:schemeClr val="tx1"/>
+            </a:fontRef>
+          </p:style>
+        </p:cxnSp>
+        <p:cxnSp>
+          <p:nvCxnSpPr>
+            <p:cNvPr id="41" name="Straight Arrow Connector 40">
+              <a:extLst>
+                <a:ext uri="{FF2B5EF4-FFF2-40B4-BE49-F238E27FC236}">
+                  <a16:creationId xmlns:a16="http://schemas.microsoft.com/office/drawing/2014/main" id="{5F67BFD1-7CDA-B734-14C4-862274276F59}"/>
+                </a:ext>
+              </a:extLst>
+            </p:cNvPr>
+            <p:cNvCxnSpPr>
+              <a:cxnSpLocks/>
+            </p:cNvCxnSpPr>
+            <p:nvPr/>
+          </p:nvCxnSpPr>
+          <p:spPr>
+            <a:xfrm>
+              <a:off x="8497924" y="1520666"/>
+              <a:ext cx="828000" cy="0"/>
+            </a:xfrm>
+            <a:prstGeom prst="straightConnector1">
+              <a:avLst/>
+            </a:prstGeom>
+            <a:ln w="38100">
+              <a:solidFill>
+                <a:srgbClr val="00252A"/>
+              </a:solidFill>
+              <a:tailEnd type="triangle"/>
+            </a:ln>
+          </p:spPr>
+          <p:style>
+            <a:lnRef idx="1">
+              <a:schemeClr val="accent1"/>
+            </a:lnRef>
+            <a:fillRef idx="0">
+              <a:schemeClr val="accent1"/>
+            </a:fillRef>
+            <a:effectRef idx="0">
+              <a:schemeClr val="accent1"/>
+            </a:effectRef>
+            <a:fontRef idx="minor">
+              <a:schemeClr val="tx1"/>
+            </a:fontRef>
+          </p:style>
+        </p:cxnSp>
+        <p:cxnSp>
+          <p:nvCxnSpPr>
+            <p:cNvPr id="48" name="Straight Arrow Connector 47">
+              <a:extLst>
+                <a:ext uri="{FF2B5EF4-FFF2-40B4-BE49-F238E27FC236}">
+                  <a16:creationId xmlns:a16="http://schemas.microsoft.com/office/drawing/2014/main" id="{FBA5C092-BA8F-7910-3AFC-DDF48589BA42}"/>
+                </a:ext>
+              </a:extLst>
+            </p:cNvPr>
+            <p:cNvCxnSpPr>
+              <a:cxnSpLocks/>
+            </p:cNvCxnSpPr>
+            <p:nvPr/>
+          </p:nvCxnSpPr>
+          <p:spPr>
+            <a:xfrm>
+              <a:off x="8497924" y="1730216"/>
+              <a:ext cx="828000" cy="516"/>
+            </a:xfrm>
+            <a:prstGeom prst="straightConnector1">
+              <a:avLst/>
+            </a:prstGeom>
+            <a:ln w="38100">
+              <a:solidFill>
+                <a:srgbClr val="00252A"/>
+              </a:solidFill>
+              <a:tailEnd type="triangle"/>
+            </a:ln>
+          </p:spPr>
+          <p:style>
+            <a:lnRef idx="1">
+              <a:schemeClr val="accent1"/>
+            </a:lnRef>
+            <a:fillRef idx="0">
+              <a:schemeClr val="accent1"/>
+            </a:fillRef>
+            <a:effectRef idx="0">
+              <a:schemeClr val="accent1"/>
+            </a:effectRef>
+            <a:fontRef idx="minor">
+              <a:schemeClr val="tx1"/>
+            </a:fontRef>
+          </p:style>
+        </p:cxnSp>
+        <p:cxnSp>
+          <p:nvCxnSpPr>
+            <p:cNvPr id="50" name="Straight Arrow Connector 49">
+              <a:extLst>
+                <a:ext uri="{FF2B5EF4-FFF2-40B4-BE49-F238E27FC236}">
+                  <a16:creationId xmlns:a16="http://schemas.microsoft.com/office/drawing/2014/main" id="{6F614C44-0F76-DFB9-782F-91BA0E632F6A}"/>
+                </a:ext>
+              </a:extLst>
+            </p:cNvPr>
+            <p:cNvCxnSpPr>
+              <a:cxnSpLocks/>
+            </p:cNvCxnSpPr>
+            <p:nvPr/>
+          </p:nvCxnSpPr>
+          <p:spPr>
+            <a:xfrm>
+              <a:off x="8497924" y="1933069"/>
+              <a:ext cx="828000" cy="0"/>
+            </a:xfrm>
+            <a:prstGeom prst="straightConnector1">
+              <a:avLst/>
+            </a:prstGeom>
+            <a:ln w="38100">
+              <a:solidFill>
+                <a:srgbClr val="00252A"/>
+              </a:solidFill>
+              <a:tailEnd type="triangle"/>
+            </a:ln>
+          </p:spPr>
+          <p:style>
+            <a:lnRef idx="1">
+              <a:schemeClr val="accent1"/>
+            </a:lnRef>
+            <a:fillRef idx="0">
+              <a:schemeClr val="accent1"/>
+            </a:fillRef>
+            <a:effectRef idx="0">
+              <a:schemeClr val="accent1"/>
+            </a:effectRef>
+            <a:fontRef idx="minor">
+              <a:schemeClr val="tx1"/>
+            </a:fontRef>
+          </p:style>
+        </p:cxnSp>
+        <p:sp>
+          <p:nvSpPr>
+            <p:cNvPr id="64" name="Graphic 62" descr="Line arrow: Rotate right with solid fill">
+              <a:extLst>
+                <a:ext uri="{FF2B5EF4-FFF2-40B4-BE49-F238E27FC236}">
+                  <a16:creationId xmlns:a16="http://schemas.microsoft.com/office/drawing/2014/main" id="{2A9DDBBE-09FA-D15E-A679-D1E4F0E953C4}"/>
+                </a:ext>
+              </a:extLst>
+            </p:cNvPr>
+            <p:cNvSpPr/>
+            <p:nvPr/>
+          </p:nvSpPr>
+          <p:spPr>
+            <a:xfrm rot="15188249" flipV="1">
+              <a:off x="8560824" y="2470709"/>
+              <a:ext cx="846586" cy="626759"/>
+            </a:xfrm>
+            <a:custGeom>
+              <a:avLst/>
+              <a:gdLst>
+                <a:gd name="connsiteX0" fmla="*/ 838014 w 846586"/>
+                <a:gd name="connsiteY0" fmla="*/ 257175 h 626759"/>
+                <a:gd name="connsiteX1" fmla="*/ 798009 w 846586"/>
+                <a:gd name="connsiteY1" fmla="*/ 256223 h 626759"/>
+                <a:gd name="connsiteX2" fmla="*/ 713236 w 846586"/>
+                <a:gd name="connsiteY2" fmla="*/ 340995 h 626759"/>
+                <a:gd name="connsiteX3" fmla="*/ 357001 w 846586"/>
+                <a:gd name="connsiteY3" fmla="*/ 0 h 626759"/>
+                <a:gd name="connsiteX4" fmla="*/ 24579 w 846586"/>
+                <a:gd name="connsiteY4" fmla="*/ 226695 h 626759"/>
+                <a:gd name="connsiteX5" fmla="*/ 113161 w 846586"/>
+                <a:gd name="connsiteY5" fmla="*/ 619125 h 626759"/>
+                <a:gd name="connsiteX6" fmla="*/ 153166 w 846586"/>
+                <a:gd name="connsiteY6" fmla="*/ 617220 h 626759"/>
+                <a:gd name="connsiteX7" fmla="*/ 152214 w 846586"/>
+                <a:gd name="connsiteY7" fmla="*/ 577215 h 626759"/>
+                <a:gd name="connsiteX8" fmla="*/ 91254 w 846586"/>
+                <a:gd name="connsiteY8" fmla="*/ 218123 h 626759"/>
+                <a:gd name="connsiteX9" fmla="*/ 421771 w 846586"/>
+                <a:gd name="connsiteY9" fmla="*/ 64770 h 626759"/>
+                <a:gd name="connsiteX10" fmla="*/ 656086 w 846586"/>
+                <a:gd name="connsiteY10" fmla="*/ 343853 h 626759"/>
+                <a:gd name="connsiteX11" fmla="*/ 569409 w 846586"/>
+                <a:gd name="connsiteY11" fmla="*/ 256223 h 626759"/>
+                <a:gd name="connsiteX12" fmla="*/ 529404 w 846586"/>
+                <a:gd name="connsiteY12" fmla="*/ 256223 h 626759"/>
+                <a:gd name="connsiteX13" fmla="*/ 529404 w 846586"/>
+                <a:gd name="connsiteY13" fmla="*/ 296228 h 626759"/>
+                <a:gd name="connsiteX14" fmla="*/ 663706 w 846586"/>
+                <a:gd name="connsiteY14" fmla="*/ 430530 h 626759"/>
+                <a:gd name="connsiteX15" fmla="*/ 681804 w 846586"/>
+                <a:gd name="connsiteY15" fmla="*/ 439103 h 626759"/>
+                <a:gd name="connsiteX16" fmla="*/ 683709 w 846586"/>
+                <a:gd name="connsiteY16" fmla="*/ 439103 h 626759"/>
+                <a:gd name="connsiteX17" fmla="*/ 686566 w 846586"/>
+                <a:gd name="connsiteY17" fmla="*/ 439103 h 626759"/>
+                <a:gd name="connsiteX18" fmla="*/ 689424 w 846586"/>
+                <a:gd name="connsiteY18" fmla="*/ 439103 h 626759"/>
+                <a:gd name="connsiteX19" fmla="*/ 691329 w 846586"/>
+                <a:gd name="connsiteY19" fmla="*/ 438150 h 626759"/>
+                <a:gd name="connsiteX20" fmla="*/ 694186 w 846586"/>
+                <a:gd name="connsiteY20" fmla="*/ 437198 h 626759"/>
+                <a:gd name="connsiteX21" fmla="*/ 694186 w 846586"/>
+                <a:gd name="connsiteY21" fmla="*/ 437198 h 626759"/>
+                <a:gd name="connsiteX22" fmla="*/ 703711 w 846586"/>
+                <a:gd name="connsiteY22" fmla="*/ 430530 h 626759"/>
+                <a:gd name="connsiteX23" fmla="*/ 838014 w 846586"/>
+                <a:gd name="connsiteY23" fmla="*/ 296228 h 626759"/>
+                <a:gd name="connsiteX24" fmla="*/ 838014 w 846586"/>
+                <a:gd name="connsiteY24" fmla="*/ 257175 h 626759"/>
+              </a:gdLst>
+              <a:ahLst/>
+              <a:cxnLst>
+                <a:cxn ang="0">
+                  <a:pos x="connsiteX0" y="connsiteY0"/>
+                </a:cxn>
+                <a:cxn ang="0">
+                  <a:pos x="connsiteX1" y="connsiteY1"/>
+                </a:cxn>
+                <a:cxn ang="0">
+                  <a:pos x="connsiteX2" y="connsiteY2"/>
+                </a:cxn>
+                <a:cxn ang="0">
+                  <a:pos x="connsiteX3" y="connsiteY3"/>
+                </a:cxn>
+                <a:cxn ang="0">
+                  <a:pos x="connsiteX4" y="connsiteY4"/>
+                </a:cxn>
+                <a:cxn ang="0">
+                  <a:pos x="connsiteX5" y="connsiteY5"/>
+                </a:cxn>
+                <a:cxn ang="0">
+                  <a:pos x="connsiteX6" y="connsiteY6"/>
+                </a:cxn>
+                <a:cxn ang="0">
+                  <a:pos x="connsiteX7" y="connsiteY7"/>
+                </a:cxn>
+                <a:cxn ang="0">
+                  <a:pos x="connsiteX8" y="connsiteY8"/>
+                </a:cxn>
+                <a:cxn ang="0">
+                  <a:pos x="connsiteX9" y="connsiteY9"/>
+                </a:cxn>
+                <a:cxn ang="0">
+                  <a:pos x="connsiteX10" y="connsiteY10"/>
+                </a:cxn>
+                <a:cxn ang="0">
+                  <a:pos x="connsiteX11" y="connsiteY11"/>
+                </a:cxn>
+                <a:cxn ang="0">
+                  <a:pos x="connsiteX12" y="connsiteY12"/>
+                </a:cxn>
+                <a:cxn ang="0">
+                  <a:pos x="connsiteX13" y="connsiteY13"/>
+                </a:cxn>
+                <a:cxn ang="0">
+                  <a:pos x="connsiteX14" y="connsiteY14"/>
+                </a:cxn>
+                <a:cxn ang="0">
+                  <a:pos x="connsiteX15" y="connsiteY15"/>
+                </a:cxn>
+                <a:cxn ang="0">
+                  <a:pos x="connsiteX16" y="connsiteY16"/>
+                </a:cxn>
+                <a:cxn ang="0">
+                  <a:pos x="connsiteX17" y="connsiteY17"/>
+                </a:cxn>
+                <a:cxn ang="0">
+                  <a:pos x="connsiteX18" y="connsiteY18"/>
+                </a:cxn>
+                <a:cxn ang="0">
+                  <a:pos x="connsiteX19" y="connsiteY19"/>
+                </a:cxn>
+                <a:cxn ang="0">
+                  <a:pos x="connsiteX20" y="connsiteY20"/>
+                </a:cxn>
+                <a:cxn ang="0">
+                  <a:pos x="connsiteX21" y="connsiteY21"/>
+                </a:cxn>
+                <a:cxn ang="0">
+                  <a:pos x="connsiteX22" y="connsiteY22"/>
+                </a:cxn>
+                <a:cxn ang="0">
+                  <a:pos x="connsiteX23" y="connsiteY23"/>
+                </a:cxn>
+                <a:cxn ang="0">
+                  <a:pos x="connsiteX24" y="connsiteY24"/>
+                </a:cxn>
+              </a:cxnLst>
+              <a:rect l="l" t="t" r="r" b="b"/>
+              <a:pathLst>
+                <a:path w="846586" h="626759">
+                  <a:moveTo>
+                    <a:pt x="838014" y="257175"/>
+                  </a:moveTo>
+                  <a:cubicBezTo>
+                    <a:pt x="827536" y="246698"/>
+                    <a:pt x="809439" y="245745"/>
+                    <a:pt x="798009" y="256223"/>
+                  </a:cubicBezTo>
+                  <a:lnTo>
+                    <a:pt x="713236" y="340995"/>
+                  </a:lnTo>
+                  <a:cubicBezTo>
+                    <a:pt x="704664" y="150495"/>
+                    <a:pt x="547501" y="0"/>
+                    <a:pt x="357001" y="0"/>
+                  </a:cubicBezTo>
+                  <a:cubicBezTo>
+                    <a:pt x="210316" y="0"/>
+                    <a:pt x="77919" y="89535"/>
+                    <a:pt x="24579" y="226695"/>
+                  </a:cubicBezTo>
+                  <a:cubicBezTo>
+                    <a:pt x="-28761" y="362903"/>
+                    <a:pt x="6481" y="519112"/>
+                    <a:pt x="113161" y="619125"/>
+                  </a:cubicBezTo>
+                  <a:cubicBezTo>
+                    <a:pt x="124591" y="629602"/>
+                    <a:pt x="142689" y="629602"/>
+                    <a:pt x="153166" y="617220"/>
+                  </a:cubicBezTo>
+                  <a:cubicBezTo>
+                    <a:pt x="163644" y="605790"/>
+                    <a:pt x="163644" y="587693"/>
+                    <a:pt x="152214" y="577215"/>
+                  </a:cubicBezTo>
+                  <a:cubicBezTo>
+                    <a:pt x="53154" y="484823"/>
+                    <a:pt x="28389" y="337185"/>
+                    <a:pt x="91254" y="218123"/>
+                  </a:cubicBezTo>
+                  <a:cubicBezTo>
+                    <a:pt x="154119" y="98107"/>
+                    <a:pt x="290326" y="35242"/>
+                    <a:pt x="421771" y="64770"/>
+                  </a:cubicBezTo>
+                  <a:cubicBezTo>
+                    <a:pt x="554169" y="94298"/>
+                    <a:pt x="650371" y="208598"/>
+                    <a:pt x="656086" y="343853"/>
+                  </a:cubicBezTo>
+                  <a:lnTo>
+                    <a:pt x="569409" y="256223"/>
+                  </a:lnTo>
+                  <a:cubicBezTo>
+                    <a:pt x="557979" y="244792"/>
+                    <a:pt x="539881" y="244792"/>
+                    <a:pt x="529404" y="256223"/>
+                  </a:cubicBezTo>
+                  <a:cubicBezTo>
+                    <a:pt x="518926" y="267653"/>
+                    <a:pt x="517974" y="285750"/>
+                    <a:pt x="529404" y="296228"/>
+                  </a:cubicBezTo>
+                  <a:lnTo>
+                    <a:pt x="663706" y="430530"/>
+                  </a:lnTo>
+                  <a:cubicBezTo>
+                    <a:pt x="668469" y="435293"/>
+                    <a:pt x="675136" y="438150"/>
+                    <a:pt x="681804" y="439103"/>
+                  </a:cubicBezTo>
+                  <a:lnTo>
+                    <a:pt x="683709" y="439103"/>
+                  </a:lnTo>
+                  <a:lnTo>
+                    <a:pt x="686566" y="439103"/>
+                  </a:lnTo>
+                  <a:lnTo>
+                    <a:pt x="689424" y="439103"/>
+                  </a:lnTo>
+                  <a:lnTo>
+                    <a:pt x="691329" y="438150"/>
+                  </a:lnTo>
+                  <a:cubicBezTo>
+                    <a:pt x="692281" y="438150"/>
+                    <a:pt x="693234" y="437198"/>
+                    <a:pt x="694186" y="437198"/>
+                  </a:cubicBezTo>
+                  <a:lnTo>
+                    <a:pt x="694186" y="437198"/>
+                  </a:lnTo>
+                  <a:cubicBezTo>
+                    <a:pt x="697996" y="436245"/>
+                    <a:pt x="700854" y="433387"/>
+                    <a:pt x="703711" y="430530"/>
+                  </a:cubicBezTo>
+                  <a:lnTo>
+                    <a:pt x="838014" y="296228"/>
+                  </a:lnTo>
+                  <a:cubicBezTo>
+                    <a:pt x="849444" y="285750"/>
+                    <a:pt x="849444" y="267653"/>
+                    <a:pt x="838014" y="257175"/>
+                  </a:cubicBezTo>
+                  <a:close/>
+                </a:path>
+              </a:pathLst>
+            </a:custGeom>
+            <a:solidFill>
+              <a:srgbClr val="00252A"/>
+            </a:solidFill>
+            <a:ln w="9525" cap="flat">
+              <a:noFill/>
+              <a:prstDash val="solid"/>
+              <a:miter/>
+            </a:ln>
+          </p:spPr>
+          <p:txBody>
+            <a:bodyPr rtlCol="0" anchor="ctr"/>
+            <a:lstStyle/>
+            <a:p>
+              <a:endParaRPr lang="en-AU" dirty="0"/>
+            </a:p>
+          </p:txBody>
+        </p:sp>
+        <p:cxnSp>
+          <p:nvCxnSpPr>
+            <p:cNvPr id="79" name="Connector: Elbow 78">
+              <a:extLst>
+                <a:ext uri="{FF2B5EF4-FFF2-40B4-BE49-F238E27FC236}">
+                  <a16:creationId xmlns:a16="http://schemas.microsoft.com/office/drawing/2014/main" id="{74F4726D-6277-0F2C-4AA8-C58D354ED3A5}"/>
+                </a:ext>
+              </a:extLst>
+            </p:cNvPr>
+            <p:cNvCxnSpPr>
+              <a:cxnSpLocks/>
+              <a:stCxn id="2" idx="2"/>
+              <a:endCxn id="6" idx="1"/>
+            </p:cNvCxnSpPr>
+            <p:nvPr/>
+          </p:nvCxnSpPr>
+          <p:spPr>
+            <a:xfrm rot="16200000" flipH="1">
+              <a:off x="3653271" y="1762477"/>
+              <a:ext cx="328664" cy="373402"/>
+            </a:xfrm>
+            <a:prstGeom prst="bentConnector2">
+              <a:avLst/>
+            </a:prstGeom>
+            <a:ln w="38100">
+              <a:solidFill>
+                <a:srgbClr val="00252A"/>
+              </a:solidFill>
+              <a:tailEnd type="triangle"/>
+            </a:ln>
+          </p:spPr>
+          <p:style>
+            <a:lnRef idx="1">
+              <a:schemeClr val="accent1"/>
+            </a:lnRef>
+            <a:fillRef idx="0">
+              <a:schemeClr val="accent1"/>
+            </a:fillRef>
+            <a:effectRef idx="0">
+              <a:schemeClr val="accent1"/>
+            </a:effectRef>
+            <a:fontRef idx="minor">
+              <a:schemeClr val="tx1"/>
+            </a:fontRef>
+          </p:style>
+        </p:cxnSp>
+        <p:cxnSp>
+          <p:nvCxnSpPr>
+            <p:cNvPr id="85" name="Connector: Elbow 84">
+              <a:extLst>
+                <a:ext uri="{FF2B5EF4-FFF2-40B4-BE49-F238E27FC236}">
+                  <a16:creationId xmlns:a16="http://schemas.microsoft.com/office/drawing/2014/main" id="{B529D85B-5E1D-DDD2-9B7F-B739DA221C82}"/>
+                </a:ext>
+              </a:extLst>
+            </p:cNvPr>
+            <p:cNvCxnSpPr>
+              <a:cxnSpLocks/>
+              <a:stCxn id="6" idx="3"/>
+              <a:endCxn id="3" idx="1"/>
+            </p:cNvCxnSpPr>
+            <p:nvPr/>
+          </p:nvCxnSpPr>
+          <p:spPr>
+            <a:xfrm flipV="1">
+              <a:off x="5851306" y="1424062"/>
+              <a:ext cx="1012293" cy="689448"/>
+            </a:xfrm>
+            <a:prstGeom prst="bentConnector3">
+              <a:avLst>
+                <a:gd name="adj1" fmla="val 50000"/>
+              </a:avLst>
+            </a:prstGeom>
+            <a:ln w="38100">
+              <a:solidFill>
+                <a:srgbClr val="00252A"/>
+              </a:solidFill>
+              <a:tailEnd type="triangle"/>
+            </a:ln>
+          </p:spPr>
+          <p:style>
+            <a:lnRef idx="1">
+              <a:schemeClr val="accent1"/>
+            </a:lnRef>
+            <a:fillRef idx="0">
+              <a:schemeClr val="accent1"/>
+            </a:fillRef>
+            <a:effectRef idx="0">
+              <a:schemeClr val="accent1"/>
+            </a:effectRef>
+            <a:fontRef idx="minor">
+              <a:schemeClr val="tx1"/>
+            </a:fontRef>
+          </p:style>
+        </p:cxnSp>
+        <p:cxnSp>
+          <p:nvCxnSpPr>
+            <p:cNvPr id="88" name="Connector: Elbow 87">
+              <a:extLst>
+                <a:ext uri="{FF2B5EF4-FFF2-40B4-BE49-F238E27FC236}">
+                  <a16:creationId xmlns:a16="http://schemas.microsoft.com/office/drawing/2014/main" id="{50319F2D-EDC3-EFAB-493C-A590A8CDDD33}"/>
+                </a:ext>
+              </a:extLst>
+            </p:cNvPr>
+            <p:cNvCxnSpPr>
+              <a:cxnSpLocks/>
+              <a:stCxn id="6" idx="3"/>
+              <a:endCxn id="5" idx="1"/>
+            </p:cNvCxnSpPr>
+            <p:nvPr/>
+          </p:nvCxnSpPr>
+          <p:spPr>
+            <a:xfrm>
+              <a:off x="5851306" y="2113510"/>
+              <a:ext cx="1012292" cy="734604"/>
+            </a:xfrm>
+            <a:prstGeom prst="bentConnector3">
+              <a:avLst>
+                <a:gd name="adj1" fmla="val 50000"/>
+              </a:avLst>
+            </a:prstGeom>
+            <a:ln w="38100">
+              <a:solidFill>
+                <a:srgbClr val="00252A"/>
+              </a:solidFill>
+              <a:tailEnd type="triangle"/>
+            </a:ln>
+          </p:spPr>
+          <p:style>
+            <a:lnRef idx="1">
+              <a:schemeClr val="accent1"/>
+            </a:lnRef>
+            <a:fillRef idx="0">
+              <a:schemeClr val="accent1"/>
+            </a:fillRef>
+            <a:effectRef idx="0">
+              <a:schemeClr val="accent1"/>
+            </a:effectRef>
+            <a:fontRef idx="minor">
+              <a:schemeClr val="tx1"/>
+            </a:fontRef>
+          </p:style>
+        </p:cxnSp>
+      </p:grpSp>
+    </p:spTree>
+    <p:extLst>
+      <p:ext uri="{BB962C8B-B14F-4D97-AF65-F5344CB8AC3E}">
+        <p14:creationId xmlns:p14="http://schemas.microsoft.com/office/powerpoint/2010/main" val="758282253"/>
+      </p:ext>
+    </p:extLst>
+  </p:cSld>
+  <p:clrMapOvr>
+    <a:masterClrMapping/>
+  </p:clrMapOvr>
+</p:sld>
+</file>
+
 <file path=ppt/theme/theme1.xml><?xml version="1.0" encoding="utf-8"?>
 <a:theme xmlns:a="http://schemas.openxmlformats.org/drawingml/2006/main" name="Office Theme">
   <a:themeElements>

</xml_diff>